<commit_message>
ShowStartGame és runGame diák hozzáfűzése
</commit_message>
<xml_diff>
--- a/pygame01.pptx
+++ b/pygame01.pptx
@@ -8,9 +8,12 @@
     <p:sldId id="256" r:id="rId2"/>
     <p:sldId id="258" r:id="rId3"/>
     <p:sldId id="257" r:id="rId4"/>
-    <p:sldId id="259" r:id="rId5"/>
-    <p:sldId id="260" r:id="rId6"/>
-    <p:sldId id="261" r:id="rId7"/>
+    <p:sldId id="262" r:id="rId5"/>
+    <p:sldId id="263" r:id="rId6"/>
+    <p:sldId id="264" r:id="rId7"/>
+    <p:sldId id="259" r:id="rId8"/>
+    <p:sldId id="260" r:id="rId9"/>
+    <p:sldId id="261" r:id="rId10"/>
   </p:sldIdLst>
   <p:sldSz cx="12192000" cy="6858000"/>
   <p:notesSz cx="6858000" cy="9144000"/>
@@ -3593,8 +3596,8 @@
         </p:nvCxnSpPr>
         <p:spPr>
           <a:xfrm flipV="1">
-            <a:off x="2574715" y="4560983"/>
-            <a:ext cx="994750" cy="817058"/>
+            <a:off x="2574716" y="4560983"/>
+            <a:ext cx="994749" cy="817058"/>
           </a:xfrm>
           <a:prstGeom prst="straightConnector1">
             <a:avLst/>
@@ -3629,8 +3632,8 @@
         </p:nvSpPr>
         <p:spPr>
           <a:xfrm>
-            <a:off x="476352" y="5378041"/>
-            <a:ext cx="4196726" cy="646331"/>
+            <a:off x="424255" y="5378041"/>
+            <a:ext cx="4300921" cy="646331"/>
           </a:xfrm>
           <a:prstGeom prst="rect">
             <a:avLst/>
@@ -3649,8 +3652,8 @@
               <a:t>Az ablak </a:t>
             </a:r>
             <a:r>
-              <a:rPr lang="hu-HU" sz="3600" dirty="0" err="1" smtClean="0"/>
-              <a:t>újrarajzolása</a:t>
+              <a:rPr lang="hu-HU" sz="3600" dirty="0" smtClean="0"/>
+              <a:t>újra rajzolása</a:t>
             </a:r>
             <a:endParaRPr lang="hu-HU" sz="3600" dirty="0"/>
           </a:p>
@@ -3670,6 +3673,293 @@
 </file>
 
 <file path=ppt/slides/slide4.xml><?xml version="1.0" encoding="utf-8"?>
+<p:sld xmlns:a="http://schemas.openxmlformats.org/drawingml/2006/main" xmlns:r="http://schemas.openxmlformats.org/officeDocument/2006/relationships" xmlns:p="http://schemas.openxmlformats.org/presentationml/2006/main">
+  <p:cSld>
+    <p:spTree>
+      <p:nvGrpSpPr>
+        <p:cNvPr id="1" name=""/>
+        <p:cNvGrpSpPr/>
+        <p:nvPr/>
+      </p:nvGrpSpPr>
+      <p:grpSpPr>
+        <a:xfrm>
+          <a:off x="0" y="0"/>
+          <a:ext cx="0" cy="0"/>
+          <a:chOff x="0" y="0"/>
+          <a:chExt cx="0" cy="0"/>
+        </a:xfrm>
+      </p:grpSpPr>
+      <p:pic>
+        <p:nvPicPr>
+          <p:cNvPr id="2" name="Kép 1"/>
+          <p:cNvPicPr>
+            <a:picLocks noChangeAspect="1"/>
+          </p:cNvPicPr>
+          <p:nvPr/>
+        </p:nvPicPr>
+        <p:blipFill>
+          <a:blip r:embed="rId2"/>
+          <a:stretch>
+            <a:fillRect/>
+          </a:stretch>
+        </p:blipFill>
+        <p:spPr>
+          <a:xfrm>
+            <a:off x="847506" y="588843"/>
+            <a:ext cx="7811752" cy="5586446"/>
+          </a:xfrm>
+          <a:prstGeom prst="rect">
+            <a:avLst/>
+          </a:prstGeom>
+        </p:spPr>
+      </p:pic>
+      <p:pic>
+        <p:nvPicPr>
+          <p:cNvPr id="3" name="Kép 2"/>
+          <p:cNvPicPr>
+            <a:picLocks noChangeAspect="1"/>
+          </p:cNvPicPr>
+          <p:nvPr/>
+        </p:nvPicPr>
+        <p:blipFill>
+          <a:blip r:embed="rId3"/>
+          <a:stretch>
+            <a:fillRect/>
+          </a:stretch>
+        </p:blipFill>
+        <p:spPr>
+          <a:xfrm>
+            <a:off x="4956797" y="5131181"/>
+            <a:ext cx="6420746" cy="1385631"/>
+          </a:xfrm>
+          <a:prstGeom prst="rect">
+            <a:avLst/>
+          </a:prstGeom>
+        </p:spPr>
+      </p:pic>
+    </p:spTree>
+    <p:extLst>
+      <p:ext uri="{BB962C8B-B14F-4D97-AF65-F5344CB8AC3E}">
+        <p14:creationId xmlns:p14="http://schemas.microsoft.com/office/powerpoint/2010/main" val="537679220"/>
+      </p:ext>
+    </p:extLst>
+  </p:cSld>
+  <p:clrMapOvr>
+    <a:masterClrMapping/>
+  </p:clrMapOvr>
+</p:sld>
+</file>
+
+<file path=ppt/slides/slide5.xml><?xml version="1.0" encoding="utf-8"?>
+<p:sld xmlns:a="http://schemas.openxmlformats.org/drawingml/2006/main" xmlns:r="http://schemas.openxmlformats.org/officeDocument/2006/relationships" xmlns:p="http://schemas.openxmlformats.org/presentationml/2006/main">
+  <p:cSld>
+    <p:spTree>
+      <p:nvGrpSpPr>
+        <p:cNvPr id="1" name=""/>
+        <p:cNvGrpSpPr/>
+        <p:nvPr/>
+      </p:nvGrpSpPr>
+      <p:grpSpPr>
+        <a:xfrm>
+          <a:off x="0" y="0"/>
+          <a:ext cx="0" cy="0"/>
+          <a:chOff x="0" y="0"/>
+          <a:chExt cx="0" cy="0"/>
+        </a:xfrm>
+      </p:grpSpPr>
+      <p:sp>
+        <p:nvSpPr>
+          <p:cNvPr id="4" name="Cím 3"/>
+          <p:cNvSpPr>
+            <a:spLocks noGrp="1"/>
+          </p:cNvSpPr>
+          <p:nvPr>
+            <p:ph type="title"/>
+          </p:nvPr>
+        </p:nvSpPr>
+        <p:spPr/>
+        <p:txBody>
+          <a:bodyPr/>
+          <a:lstStyle/>
+          <a:p>
+            <a:r>
+              <a:rPr lang="hu-HU" dirty="0" err="1" smtClean="0"/>
+              <a:t>showStartScreen</a:t>
+            </a:r>
+            <a:r>
+              <a:rPr lang="hu-HU" dirty="0" smtClean="0"/>
+              <a:t>()</a:t>
+            </a:r>
+            <a:endParaRPr lang="hu-HU" dirty="0"/>
+          </a:p>
+        </p:txBody>
+      </p:sp>
+      <p:pic>
+        <p:nvPicPr>
+          <p:cNvPr id="6" name="Kép 5"/>
+          <p:cNvPicPr>
+            <a:picLocks noChangeAspect="1"/>
+          </p:cNvPicPr>
+          <p:nvPr/>
+        </p:nvPicPr>
+        <p:blipFill>
+          <a:blip r:embed="rId2"/>
+          <a:stretch>
+            <a:fillRect/>
+          </a:stretch>
+        </p:blipFill>
+        <p:spPr>
+          <a:xfrm>
+            <a:off x="838200" y="1690688"/>
+            <a:ext cx="9183382" cy="4267796"/>
+          </a:xfrm>
+          <a:prstGeom prst="rect">
+            <a:avLst/>
+          </a:prstGeom>
+        </p:spPr>
+      </p:pic>
+      <p:pic>
+        <p:nvPicPr>
+          <p:cNvPr id="5" name="Kép 4"/>
+          <p:cNvPicPr>
+            <a:picLocks noChangeAspect="1"/>
+          </p:cNvPicPr>
+          <p:nvPr/>
+        </p:nvPicPr>
+        <p:blipFill rotWithShape="1">
+          <a:blip r:embed="rId3"/>
+          <a:srcRect l="10125" t="17334" r="39875" b="12222"/>
+          <a:stretch/>
+        </p:blipFill>
+        <p:spPr>
+          <a:xfrm>
+            <a:off x="5753982" y="1957388"/>
+            <a:ext cx="5599818" cy="4437856"/>
+          </a:xfrm>
+          <a:prstGeom prst="rect">
+            <a:avLst/>
+          </a:prstGeom>
+        </p:spPr>
+      </p:pic>
+    </p:spTree>
+    <p:extLst>
+      <p:ext uri="{BB962C8B-B14F-4D97-AF65-F5344CB8AC3E}">
+        <p14:creationId xmlns:p14="http://schemas.microsoft.com/office/powerpoint/2010/main" val="3600994480"/>
+      </p:ext>
+    </p:extLst>
+  </p:cSld>
+  <p:clrMapOvr>
+    <a:masterClrMapping/>
+  </p:clrMapOvr>
+</p:sld>
+</file>
+
+<file path=ppt/slides/slide6.xml><?xml version="1.0" encoding="utf-8"?>
+<p:sld xmlns:a="http://schemas.openxmlformats.org/drawingml/2006/main" xmlns:r="http://schemas.openxmlformats.org/officeDocument/2006/relationships" xmlns:p="http://schemas.openxmlformats.org/presentationml/2006/main">
+  <p:cSld>
+    <p:spTree>
+      <p:nvGrpSpPr>
+        <p:cNvPr id="1" name=""/>
+        <p:cNvGrpSpPr/>
+        <p:nvPr/>
+      </p:nvGrpSpPr>
+      <p:grpSpPr>
+        <a:xfrm>
+          <a:off x="0" y="0"/>
+          <a:ext cx="0" cy="0"/>
+          <a:chOff x="0" y="0"/>
+          <a:chExt cx="0" cy="0"/>
+        </a:xfrm>
+      </p:grpSpPr>
+      <p:sp>
+        <p:nvSpPr>
+          <p:cNvPr id="2" name="Cím 1"/>
+          <p:cNvSpPr>
+            <a:spLocks noGrp="1"/>
+          </p:cNvSpPr>
+          <p:nvPr>
+            <p:ph type="title"/>
+          </p:nvPr>
+        </p:nvSpPr>
+        <p:spPr/>
+        <p:txBody>
+          <a:bodyPr/>
+          <a:lstStyle/>
+          <a:p>
+            <a:r>
+              <a:rPr lang="hu-HU" dirty="0" err="1" smtClean="0"/>
+              <a:t>runGame</a:t>
+            </a:r>
+            <a:r>
+              <a:rPr lang="hu-HU" dirty="0" smtClean="0"/>
+              <a:t>()</a:t>
+            </a:r>
+            <a:endParaRPr lang="hu-HU" dirty="0"/>
+          </a:p>
+        </p:txBody>
+      </p:sp>
+      <p:pic>
+        <p:nvPicPr>
+          <p:cNvPr id="3" name="Kép 2"/>
+          <p:cNvPicPr>
+            <a:picLocks noChangeAspect="1"/>
+          </p:cNvPicPr>
+          <p:nvPr/>
+        </p:nvPicPr>
+        <p:blipFill>
+          <a:blip r:embed="rId2"/>
+          <a:stretch>
+            <a:fillRect/>
+          </a:stretch>
+        </p:blipFill>
+        <p:spPr>
+          <a:xfrm>
+            <a:off x="838200" y="1690688"/>
+            <a:ext cx="5982535" cy="3753374"/>
+          </a:xfrm>
+          <a:prstGeom prst="rect">
+            <a:avLst/>
+          </a:prstGeom>
+        </p:spPr>
+      </p:pic>
+      <p:pic>
+        <p:nvPicPr>
+          <p:cNvPr id="4" name="Kép 3"/>
+          <p:cNvPicPr>
+            <a:picLocks noChangeAspect="1"/>
+          </p:cNvPicPr>
+          <p:nvPr/>
+        </p:nvPicPr>
+        <p:blipFill>
+          <a:blip r:embed="rId3"/>
+          <a:stretch>
+            <a:fillRect/>
+          </a:stretch>
+        </p:blipFill>
+        <p:spPr>
+          <a:xfrm>
+            <a:off x="6147855" y="2116999"/>
+            <a:ext cx="5205945" cy="4127060"/>
+          </a:xfrm>
+          <a:prstGeom prst="rect">
+            <a:avLst/>
+          </a:prstGeom>
+        </p:spPr>
+      </p:pic>
+    </p:spTree>
+    <p:extLst>
+      <p:ext uri="{BB962C8B-B14F-4D97-AF65-F5344CB8AC3E}">
+        <p14:creationId xmlns:p14="http://schemas.microsoft.com/office/powerpoint/2010/main" val="3185032208"/>
+      </p:ext>
+    </p:extLst>
+  </p:cSld>
+  <p:clrMapOvr>
+    <a:masterClrMapping/>
+  </p:clrMapOvr>
+</p:sld>
+</file>
+
+<file path=ppt/slides/slide7.xml><?xml version="1.0" encoding="utf-8"?>
 <p:sld xmlns:a="http://schemas.openxmlformats.org/drawingml/2006/main" xmlns:r="http://schemas.openxmlformats.org/officeDocument/2006/relationships" xmlns:p="http://schemas.openxmlformats.org/presentationml/2006/main">
   <p:cSld>
     <p:spTree>
@@ -5091,7 +5381,7 @@
 </p:sld>
 </file>
 
-<file path=ppt/slides/slide5.xml><?xml version="1.0" encoding="utf-8"?>
+<file path=ppt/slides/slide8.xml><?xml version="1.0" encoding="utf-8"?>
 <p:sld xmlns:a="http://schemas.openxmlformats.org/drawingml/2006/main" xmlns:r="http://schemas.openxmlformats.org/officeDocument/2006/relationships" xmlns:p="http://schemas.openxmlformats.org/presentationml/2006/main">
   <p:cSld>
     <p:spTree>
@@ -5951,7 +6241,7 @@
 </p:sld>
 </file>
 
-<file path=ppt/slides/slide6.xml><?xml version="1.0" encoding="utf-8"?>
+<file path=ppt/slides/slide9.xml><?xml version="1.0" encoding="utf-8"?>
 <p:sld xmlns:a="http://schemas.openxmlformats.org/drawingml/2006/main" xmlns:r="http://schemas.openxmlformats.org/officeDocument/2006/relationships" xmlns:p="http://schemas.openxmlformats.org/presentationml/2006/main">
   <p:cSld>
     <p:spTree>

</xml_diff>